<commit_message>
Updates on "07. Email" slides
</commit_message>
<xml_diff>
--- a/Courses/Computer-Modeling-and-IT/Computer-Modeling-and-IT-5-Class/07-Email/07-Email.pptx
+++ b/Courses/Computer-Modeling-and-IT/Computer-Modeling-and-IT-5-Class/07-Email/07-Email.pptx
@@ -319,7 +319,7 @@
           <a:p>
             <a:fld id="{4E087215-0C8F-4762-A664-737A353EC9A4}" type="datetimeFigureOut">
               <a:rPr lang="bg-BG" smtClean="0"/>
-              <a:t>3.1.2024 г.</a:t>
+              <a:t>15.01.24 г.</a:t>
             </a:fld>
             <a:endParaRPr lang="bg-BG"/>
           </a:p>
@@ -515,7 +515,7 @@
           <a:p>
             <a:fld id="{72D84649-876A-46C9-8472-14CB09C070D8}" type="datetimeFigureOut">
               <a:rPr lang="en-US" smtClean="0"/>
-              <a:t>1/3/2024</a:t>
+              <a:t>1/15/24</a:t>
             </a:fld>
             <a:endParaRPr lang="en-US"/>
           </a:p>
@@ -4255,7 +4255,7 @@
             <a:fld id="{055373AC-9AA7-423B-BA00-BA1C74164DBD}" type="datetime1">
               <a:rPr lang="en-US" smtClean="0"/>
               <a:pPr/>
-              <a:t>1/3/2024</a:t>
+              <a:t>1/15/24</a:t>
             </a:fld>
             <a:endParaRPr lang="en-US" dirty="0"/>
           </a:p>
@@ -7653,7 +7653,7 @@
         </p:nvSpPr>
         <p:spPr>
           <a:xfrm>
-            <a:off x="6390120" y="6086106"/>
+            <a:off x="6382740" y="5762301"/>
             <a:ext cx="5248260" cy="341313"/>
           </a:xfrm>
         </p:spPr>
@@ -7688,7 +7688,7 @@
         </p:nvSpPr>
         <p:spPr>
           <a:xfrm>
-            <a:off x="5781000" y="5698189"/>
+            <a:off x="5780998" y="5355152"/>
             <a:ext cx="5857382" cy="374236"/>
           </a:xfrm>
         </p:spPr>
@@ -7729,8 +7729,8 @@
         </p:blipFill>
         <p:spPr>
           <a:xfrm>
-            <a:off x="6390123" y="2979001"/>
-            <a:ext cx="5248260" cy="2610000"/>
+            <a:off x="7176000" y="2722680"/>
+            <a:ext cx="4614851" cy="2295001"/>
           </a:xfrm>
         </p:spPr>
       </p:pic>
@@ -7780,16 +7780,15 @@
           </p:cNvPicPr>
           <p:nvPr/>
         </p:nvPicPr>
-        <p:blipFill>
+        <p:blipFill rotWithShape="1">
           <a:blip r:embed="rId2"/>
-          <a:stretch>
-            <a:fillRect/>
-          </a:stretch>
+          <a:srcRect b="725"/>
+          <a:stretch/>
         </p:blipFill>
         <p:spPr>
           <a:xfrm>
             <a:off x="1223935" y="1269001"/>
-            <a:ext cx="9740770" cy="5276250"/>
+            <a:ext cx="9740770" cy="5237999"/>
           </a:xfrm>
           <a:prstGeom prst="rect">
             <a:avLst/>
@@ -7866,8 +7865,8 @@
           </a:xfrm>
           <a:prstGeom prst="wedgeRoundRectCallout">
             <a:avLst>
-              <a:gd name="adj1" fmla="val 48952"/>
-              <a:gd name="adj2" fmla="val 81904"/>
+              <a:gd name="adj1" fmla="val 53805"/>
+              <a:gd name="adj2" fmla="val 86097"/>
               <a:gd name="adj3" fmla="val 16667"/>
             </a:avLst>
           </a:prstGeom>
@@ -8350,7 +8349,7 @@
         </p:nvSpPr>
         <p:spPr bwMode="auto">
           <a:xfrm>
-            <a:off x="5771537" y="1269001"/>
+            <a:off x="5466000" y="1289538"/>
             <a:ext cx="6165000" cy="1530000"/>
           </a:xfrm>
           <a:prstGeom prst="wedgeRoundRectCallout">
@@ -8667,8 +8666,8 @@
         </p:blipFill>
         <p:spPr>
           <a:xfrm>
-            <a:off x="1223935" y="1269002"/>
-            <a:ext cx="9740770" cy="5276250"/>
+            <a:off x="1029924" y="1173211"/>
+            <a:ext cx="10132151" cy="5488248"/>
           </a:xfrm>
           <a:prstGeom prst="rect">
             <a:avLst/>
@@ -8740,7 +8739,7 @@
         </p:nvSpPr>
         <p:spPr bwMode="auto">
           <a:xfrm>
-            <a:off x="966000" y="4779000"/>
+            <a:off x="1029924" y="4869000"/>
             <a:ext cx="3690000" cy="1170000"/>
           </a:xfrm>
           <a:prstGeom prst="wedgeRoundRectCallout">
@@ -9080,13 +9079,6 @@
       <p:transition spd="slow" advClick="0" advTm="5000"/>
     </mc:Fallback>
   </mc:AlternateContent>
-  <p:timing>
-    <p:tnLst>
-      <p:par>
-        <p:cTn id="1" dur="indefinite" restart="never" nodeType="tmRoot"/>
-      </p:par>
-    </p:tnLst>
-  </p:timing>
 </p:sld>
 </file>
 
@@ -9129,7 +9121,7 @@
           <a:p>
             <a:r>
               <a:rPr lang="bg-BG" dirty="0"/>
-              <a:t>Правила за безопасно ползване на ел. поща</a:t>
+              <a:t>Правила за безопасно ползване на електронна поща</a:t>
             </a:r>
             <a:endParaRPr lang="en-US" dirty="0"/>
           </a:p>
@@ -9183,13 +9175,6 @@
       <p:transition spd="slow" advClick="0" advTm="5000"/>
     </mc:Fallback>
   </mc:AlternateContent>
-  <p:timing>
-    <p:tnLst>
-      <p:par>
-        <p:cTn id="1" dur="indefinite" restart="never" nodeType="tmRoot"/>
-      </p:par>
-    </p:tnLst>
-  </p:timing>
 </p:sld>
 </file>
 
@@ -9259,13 +9244,8 @@
             </a:r>
             <a:r>
               <a:rPr lang="bg-BG" dirty="0"/>
-              <a:t>с човек, който е запознат с </a:t>
-            </a:r>
-            <a:r>
-              <a:rPr lang="bg-BG" dirty="0" smtClean="0"/>
-              <a:t>тях</a:t>
-            </a:r>
-            <a:endParaRPr lang="bg-BG" dirty="0"/>
+              <a:t>с човек, който е запознат с тях</a:t>
+            </a:r>
           </a:p>
         </p:txBody>
       </p:sp>
@@ -9475,12 +9455,8 @@
           <a:lstStyle/>
           <a:p>
             <a:r>
-              <a:rPr lang="bg-BG" b="1" dirty="0" smtClean="0"/>
-              <a:t>Не </a:t>
-            </a:r>
-            <a:r>
               <a:rPr lang="bg-BG" b="1" dirty="0"/>
-              <a:t>отваряйте рекламни писма </a:t>
+              <a:t>Не отваряйте рекламни писма </a:t>
             </a:r>
             <a:r>
               <a:rPr lang="bg-BG" dirty="0"/>
@@ -9498,13 +9474,8 @@
             </a:r>
             <a:r>
               <a:rPr lang="bg-BG" b="1" dirty="0"/>
-              <a:t>изпраща </a:t>
-            </a:r>
-            <a:r>
-              <a:rPr lang="bg-BG" b="1" dirty="0" smtClean="0"/>
-              <a:t>спам</a:t>
-            </a:r>
-            <a:endParaRPr lang="bg-BG" b="1" dirty="0"/>
+              <a:t>изпраща спам</a:t>
+            </a:r>
           </a:p>
         </p:txBody>
       </p:sp>
@@ -9712,68 +9683,80 @@
           <a:lstStyle/>
           <a:p>
             <a:r>
-              <a:rPr lang="bg-BG" b="1" dirty="0" smtClean="0"/>
+              <a:rPr lang="bg-BG" b="1" dirty="0"/>
               <a:t>Не отваряйте </a:t>
             </a:r>
             <a:r>
-              <a:rPr lang="bg-BG" dirty="0" smtClean="0"/>
+              <a:rPr lang="bg-BG" dirty="0"/>
               <a:t>и </a:t>
             </a:r>
             <a:r>
-              <a:rPr lang="bg-BG" b="1" dirty="0" smtClean="0"/>
+              <a:rPr lang="bg-BG" b="1" dirty="0"/>
               <a:t>не препращайте</a:t>
             </a:r>
             <a:r>
-              <a:rPr lang="bg-BG" dirty="0" smtClean="0"/>
+              <a:rPr lang="bg-BG" dirty="0"/>
               <a:t> </a:t>
             </a:r>
             <a:r>
-              <a:rPr lang="bg-BG" b="1" dirty="0" smtClean="0"/>
+              <a:rPr lang="bg-BG" b="1" dirty="0"/>
               <a:t>верижни съобщения </a:t>
             </a:r>
             <a:r>
-              <a:rPr lang="bg-BG" dirty="0" smtClean="0"/>
+              <a:rPr lang="bg-BG" dirty="0"/>
               <a:t>за вирус</a:t>
             </a:r>
           </a:p>
           <a:p>
             <a:r>
-              <a:rPr lang="bg-BG" b="1" dirty="0" smtClean="0"/>
+              <a:rPr lang="bg-BG" b="1" dirty="0"/>
               <a:t>Внимавайте</a:t>
             </a:r>
             <a:r>
-              <a:rPr lang="bg-BG" dirty="0" smtClean="0"/>
+              <a:rPr lang="bg-BG" dirty="0"/>
               <a:t> с писма, които ви </a:t>
             </a:r>
             <a:r>
-              <a:rPr lang="bg-BG" b="1" dirty="0" smtClean="0"/>
+              <a:rPr lang="bg-BG" b="1" dirty="0"/>
               <a:t>насочват</a:t>
             </a:r>
             <a:r>
-              <a:rPr lang="bg-BG" dirty="0" smtClean="0"/>
+              <a:rPr lang="bg-BG" dirty="0"/>
               <a:t> към някакъв </a:t>
             </a:r>
             <a:r>
-              <a:rPr lang="bg-BG" b="1" dirty="0" smtClean="0"/>
+              <a:rPr lang="bg-BG" b="1" dirty="0"/>
               <a:t>уебсайт</a:t>
             </a:r>
             <a:r>
-              <a:rPr lang="bg-BG" dirty="0" smtClean="0"/>
-              <a:t>, тъй като може да се </a:t>
-            </a:r>
-            <a:r>
-              <a:rPr lang="bg-BG" b="1" dirty="0" smtClean="0"/>
+              <a:rPr lang="bg-BG" dirty="0"/>
+              <a:t>. Може да се </a:t>
+            </a:r>
+            <a:r>
+              <a:rPr lang="bg-BG" b="1" dirty="0"/>
               <a:t>окаже</a:t>
             </a:r>
             <a:r>
-              <a:rPr lang="bg-BG" dirty="0" smtClean="0"/>
+              <a:rPr lang="bg-BG" dirty="0"/>
               <a:t> </a:t>
             </a:r>
             <a:r>
-              <a:rPr lang="bg-BG" b="1" dirty="0" smtClean="0"/>
-              <a:t>друг</a:t>
-            </a:r>
-            <a:endParaRPr lang="en-US" b="1" dirty="0"/>
+              <a:rPr lang="bg-BG" b="1" dirty="0"/>
+              <a:t>друг сайт </a:t>
+            </a:r>
+            <a:r>
+              <a:rPr lang="bg-BG" dirty="0"/>
+              <a:t>(с </a:t>
+            </a:r>
+            <a:r>
+              <a:rPr lang="bg-BG" dirty="0" err="1"/>
+              <a:t>малкот</a:t>
+            </a:r>
+            <a:r>
+              <a:rPr lang="bg-BG" dirty="0"/>
+              <a:t> този, който очаквате)</a:t>
+            </a:r>
+            <a:endParaRPr lang="en-US" dirty="0"/>
           </a:p>
         </p:txBody>
       </p:sp>
@@ -9823,8 +9806,8 @@
         </p:blipFill>
         <p:spPr bwMode="auto">
           <a:xfrm>
-            <a:off x="1191000" y="3960508"/>
-            <a:ext cx="5245775" cy="2622888"/>
+            <a:off x="1371000" y="4329000"/>
+            <a:ext cx="4590000" cy="2295000"/>
           </a:xfrm>
           <a:prstGeom prst="rect">
             <a:avLst/>
@@ -9871,7 +9854,7 @@
         </p:blipFill>
         <p:spPr bwMode="auto">
           <a:xfrm>
-            <a:off x="7086000" y="3731774"/>
+            <a:off x="7086000" y="3772378"/>
             <a:ext cx="4277433" cy="2851622"/>
           </a:xfrm>
           <a:prstGeom prst="rect">
@@ -10139,13 +10122,6 @@
       <p:transition spd="slow" advClick="0" advTm="5000"/>
     </mc:Fallback>
   </mc:AlternateContent>
-  <p:timing>
-    <p:tnLst>
-      <p:par>
-        <p:cTn id="1" dur="indefinite" restart="never" nodeType="tmRoot"/>
-      </p:par>
-    </p:tnLst>
-  </p:timing>
 </p:sld>
 </file>
 
@@ -10292,7 +10268,22 @@
                   </a:outerShdw>
                 </a:effectLst>
               </a:rPr>
-              <a:t>За да създадете ново съобщение, което да изпратите, натиснете бутона "</a:t>
+              <a:t>За да създадете ново съобщение, което да изпратите, натиснете бутона </a:t>
+            </a:r>
+            <a:r>
+              <a:rPr lang="en-US" sz="2800" dirty="0">
+                <a:solidFill>
+                  <a:srgbClr val="FFFFFF"/>
+                </a:solidFill>
+                <a:effectLst>
+                  <a:outerShdw blurRad="38100" dist="38100" dir="2700000" algn="tl">
+                    <a:srgbClr val="000000">
+                      <a:alpha val="43137"/>
+                    </a:srgbClr>
+                  </a:outerShdw>
+                </a:effectLst>
+              </a:rPr>
+              <a:t>[</a:t>
             </a:r>
             <a:r>
               <a:rPr lang="bg-BG" sz="2800" b="1" dirty="0">
@@ -10313,7 +10304,7 @@
               <a:t>Ново съобщение</a:t>
             </a:r>
             <a:r>
-              <a:rPr lang="bg-BG" sz="2800" b="1" dirty="0">
+              <a:rPr lang="en-US" sz="2800" dirty="0">
                 <a:solidFill>
                   <a:srgbClr val="FFFFFF"/>
                 </a:solidFill>
@@ -10325,20 +10316,8 @@
                   </a:outerShdw>
                 </a:effectLst>
               </a:rPr>
-              <a:t>"</a:t>
-            </a:r>
-            <a:endParaRPr lang="en-US" sz="2800" b="1" dirty="0">
-              <a:solidFill>
-                <a:srgbClr val="FFFFFF"/>
-              </a:solidFill>
-              <a:effectLst>
-                <a:outerShdw blurRad="38100" dist="38100" dir="2700000" algn="tl">
-                  <a:srgbClr val="000000">
-                    <a:alpha val="43137"/>
-                  </a:srgbClr>
-                </a:outerShdw>
-              </a:effectLst>
-            </a:endParaRPr>
+              <a:t>]</a:t>
+            </a:r>
           </a:p>
         </p:txBody>
       </p:sp>
@@ -13228,13 +13207,6 @@
       <p:transition spd="slow" advClick="0" advTm="5000"/>
     </mc:Fallback>
   </mc:AlternateContent>
-  <p:timing>
-    <p:tnLst>
-      <p:par>
-        <p:cTn id="1" dur="indefinite" restart="never" nodeType="tmRoot"/>
-      </p:par>
-    </p:tnLst>
-  </p:timing>
 </p:sld>
 </file>
 
@@ -13318,7 +13290,7 @@
         <p:spPr bwMode="auto">
           <a:xfrm>
             <a:off x="5601000" y="4059000"/>
-            <a:ext cx="4050000" cy="1530000"/>
+            <a:ext cx="4365000" cy="1530000"/>
           </a:xfrm>
           <a:prstGeom prst="wedgeRoundRectCallout">
             <a:avLst>
@@ -13384,6 +13356,21 @@
               <a:t>За да отговорите на писмото, щракнете върху бутона </a:t>
             </a:r>
             <a:r>
+              <a:rPr lang="en-US" sz="2800" dirty="0">
+                <a:solidFill>
+                  <a:srgbClr val="FFFFFF"/>
+                </a:solidFill>
+                <a:effectLst>
+                  <a:outerShdw blurRad="38100" dist="38100" dir="2700000" algn="tl">
+                    <a:srgbClr val="000000">
+                      <a:alpha val="43137"/>
+                    </a:srgbClr>
+                  </a:outerShdw>
+                </a:effectLst>
+              </a:rPr>
+              <a:t>[</a:t>
+            </a:r>
+            <a:r>
               <a:rPr lang="bg-BG" sz="2800" b="1" dirty="0">
                 <a:solidFill>
                   <a:schemeClr val="bg1">
@@ -13401,21 +13388,21 @@
               </a:rPr>
               <a:t>Отговори</a:t>
             </a:r>
-            <a:endParaRPr lang="en-US" sz="2800" b="1" dirty="0">
-              <a:solidFill>
-                <a:schemeClr val="bg1">
-                  <a:lumMod val="60000"/>
-                  <a:lumOff val="40000"/>
-                </a:schemeClr>
-              </a:solidFill>
-              <a:effectLst>
-                <a:outerShdw blurRad="38100" dist="38100" dir="2700000" algn="tl">
-                  <a:srgbClr val="000000">
-                    <a:alpha val="43137"/>
-                  </a:srgbClr>
-                </a:outerShdw>
-              </a:effectLst>
-            </a:endParaRPr>
+            <a:r>
+              <a:rPr lang="en-US" sz="2800" dirty="0">
+                <a:solidFill>
+                  <a:schemeClr val="bg2"/>
+                </a:solidFill>
+                <a:effectLst>
+                  <a:outerShdw blurRad="38100" dist="38100" dir="2700000" algn="tl">
+                    <a:srgbClr val="000000">
+                      <a:alpha val="43137"/>
+                    </a:srgbClr>
+                  </a:outerShdw>
+                </a:effectLst>
+              </a:rPr>
+              <a:t>]</a:t>
+            </a:r>
           </a:p>
         </p:txBody>
       </p:sp>
@@ -13437,84 +13424,6 @@
       <p:transition spd="slow" advClick="0" advTm="5000"/>
     </mc:Fallback>
   </mc:AlternateContent>
-  <p:timing>
-    <p:tnLst>
-      <p:par>
-        <p:cTn id="1" dur="indefinite" restart="never" nodeType="tmRoot">
-          <p:childTnLst>
-            <p:seq concurrent="1" nextAc="seek">
-              <p:cTn id="2" dur="indefinite" nodeType="mainSeq">
-                <p:childTnLst>
-                  <p:par>
-                    <p:cTn id="3" fill="hold">
-                      <p:stCondLst>
-                        <p:cond delay="indefinite"/>
-                      </p:stCondLst>
-                      <p:childTnLst>
-                        <p:par>
-                          <p:cTn id="4" fill="hold">
-                            <p:stCondLst>
-                              <p:cond delay="0"/>
-                            </p:stCondLst>
-                            <p:childTnLst>
-                              <p:par>
-                                <p:cTn id="5" presetID="1" presetClass="entr" presetSubtype="0" fill="hold" grpId="0" nodeType="clickEffect">
-                                  <p:stCondLst>
-                                    <p:cond delay="0"/>
-                                  </p:stCondLst>
-                                  <p:childTnLst>
-                                    <p:set>
-                                      <p:cBhvr>
-                                        <p:cTn id="6" dur="1" fill="hold">
-                                          <p:stCondLst>
-                                            <p:cond delay="0"/>
-                                          </p:stCondLst>
-                                        </p:cTn>
-                                        <p:tgtEl>
-                                          <p:spTgt spid="2"/>
-                                        </p:tgtEl>
-                                        <p:attrNameLst>
-                                          <p:attrName>style.visibility</p:attrName>
-                                        </p:attrNameLst>
-                                      </p:cBhvr>
-                                      <p:to>
-                                        <p:strVal val="visible"/>
-                                      </p:to>
-                                    </p:set>
-                                  </p:childTnLst>
-                                </p:cTn>
-                              </p:par>
-                            </p:childTnLst>
-                          </p:cTn>
-                        </p:par>
-                      </p:childTnLst>
-                    </p:cTn>
-                  </p:par>
-                </p:childTnLst>
-              </p:cTn>
-              <p:prevCondLst>
-                <p:cond evt="onPrev" delay="0">
-                  <p:tgtEl>
-                    <p:sldTgt/>
-                  </p:tgtEl>
-                </p:cond>
-              </p:prevCondLst>
-              <p:nextCondLst>
-                <p:cond evt="onNext" delay="0">
-                  <p:tgtEl>
-                    <p:sldTgt/>
-                  </p:tgtEl>
-                </p:cond>
-              </p:nextCondLst>
-            </p:seq>
-          </p:childTnLst>
-        </p:cTn>
-      </p:par>
-    </p:tnLst>
-    <p:bldLst>
-      <p:bldP spid="2" grpId="0" animBg="1"/>
-    </p:bldLst>
-  </p:timing>
 </p:sld>
 </file>
 
@@ -13661,7 +13570,7 @@
                   </a:outerShdw>
                 </a:effectLst>
               </a:rPr>
-              <a:t>Така се отваря форма за писане на писмо</a:t>
+              <a:t>Така се отваря форма за писане на отговор</a:t>
             </a:r>
             <a:endParaRPr lang="en-US" sz="2800" b="1" dirty="0">
               <a:solidFill>
@@ -13753,6 +13662,149 @@
               <a:t>Адресът на получателя се попълва автоматично</a:t>
             </a:r>
             <a:endParaRPr lang="en-US" sz="2800" b="1" dirty="0">
+              <a:solidFill>
+                <a:srgbClr val="FFFFFF"/>
+              </a:solidFill>
+              <a:effectLst>
+                <a:outerShdw blurRad="38100" dist="38100" dir="2700000" algn="tl">
+                  <a:srgbClr val="000000">
+                    <a:alpha val="43137"/>
+                  </a:srgbClr>
+                </a:outerShdw>
+              </a:effectLst>
+            </a:endParaRPr>
+          </a:p>
+        </p:txBody>
+      </p:sp>
+      <p:sp>
+        <p:nvSpPr>
+          <p:cNvPr id="2" name="Rounded Rectangular Callout 1">
+            <a:extLst>
+              <a:ext uri="{FF2B5EF4-FFF2-40B4-BE49-F238E27FC236}">
+                <a16:creationId xmlns:a16="http://schemas.microsoft.com/office/drawing/2014/main" id="{286AB946-9CA9-CD74-0E57-88D835DEBB1B}"/>
+              </a:ext>
+            </a:extLst>
+          </p:cNvPr>
+          <p:cNvSpPr/>
+          <p:nvPr/>
+        </p:nvSpPr>
+        <p:spPr bwMode="auto">
+          <a:xfrm>
+            <a:off x="111000" y="4599000"/>
+            <a:ext cx="3936188" cy="1575000"/>
+          </a:xfrm>
+          <a:prstGeom prst="wedgeRoundRectCallout">
+            <a:avLst>
+              <a:gd name="adj1" fmla="val 58790"/>
+              <a:gd name="adj2" fmla="val 30323"/>
+              <a:gd name="adj3" fmla="val 16667"/>
+            </a:avLst>
+          </a:prstGeom>
+          <a:solidFill>
+            <a:schemeClr val="dk2">
+              <a:alpha val="80000"/>
+            </a:schemeClr>
+          </a:solidFill>
+          <a:ln w="19050">
+            <a:solidFill>
+              <a:schemeClr val="tx1">
+                <a:lumMod val="75000"/>
+                <a:alpha val="80000"/>
+              </a:schemeClr>
+            </a:solidFill>
+          </a:ln>
+          <a:effectLst/>
+        </p:spPr>
+        <p:style>
+          <a:lnRef idx="2">
+            <a:schemeClr val="accent1">
+              <a:shade val="50000"/>
+            </a:schemeClr>
+          </a:lnRef>
+          <a:fillRef idx="1001">
+            <a:schemeClr val="dk2"/>
+          </a:fillRef>
+          <a:effectRef idx="0">
+            <a:schemeClr val="accent1"/>
+          </a:effectRef>
+          <a:fontRef idx="minor">
+            <a:schemeClr val="lt1"/>
+          </a:fontRef>
+        </p:style>
+        <p:txBody>
+          <a:bodyPr rot="0" spcFirstLastPara="0" vertOverflow="overflow" horzOverflow="overflow" vert="horz" wrap="square" lIns="91440" tIns="45720" rIns="91440" bIns="45720" numCol="1" spcCol="0" rtlCol="0" fromWordArt="0" anchor="ctr" anchorCtr="0" forceAA="0" compatLnSpc="1">
+            <a:prstTxWarp prst="textNoShape">
+              <a:avLst/>
+            </a:prstTxWarp>
+            <a:noAutofit/>
+          </a:bodyPr>
+          <a:lstStyle/>
+          <a:p>
+            <a:pPr algn="ctr"/>
+            <a:r>
+              <a:rPr lang="bg-BG" sz="2800" b="1" dirty="0">
+                <a:solidFill>
+                  <a:srgbClr val="FFFFFF"/>
+                </a:solidFill>
+                <a:effectLst>
+                  <a:outerShdw blurRad="38100" dist="38100" dir="2700000" algn="tl">
+                    <a:srgbClr val="000000">
+                      <a:alpha val="43137"/>
+                    </a:srgbClr>
+                  </a:outerShdw>
+                </a:effectLst>
+              </a:rPr>
+              <a:t>Попълнете отговора и след това го изпратете от бутона </a:t>
+            </a:r>
+            <a:r>
+              <a:rPr lang="en-US" sz="2800" b="1" dirty="0">
+                <a:solidFill>
+                  <a:srgbClr val="FFFFFF"/>
+                </a:solidFill>
+                <a:effectLst>
+                  <a:outerShdw blurRad="38100" dist="38100" dir="2700000" algn="tl">
+                    <a:srgbClr val="000000">
+                      <a:alpha val="43137"/>
+                    </a:srgbClr>
+                  </a:outerShdw>
+                </a:effectLst>
+              </a:rPr>
+              <a:t>[</a:t>
+            </a:r>
+            <a:r>
+              <a:rPr lang="bg-BG" sz="2800" b="1" dirty="0">
+                <a:solidFill>
+                  <a:schemeClr val="bg1">
+                    <a:lumMod val="60000"/>
+                    <a:lumOff val="40000"/>
+                  </a:schemeClr>
+                </a:solidFill>
+                <a:effectLst>
+                  <a:outerShdw blurRad="38100" dist="38100" dir="2700000" algn="tl">
+                    <a:srgbClr val="000000">
+                      <a:alpha val="43137"/>
+                    </a:srgbClr>
+                  </a:outerShdw>
+                </a:effectLst>
+              </a:rPr>
+              <a:t>Изпращане</a:t>
+            </a:r>
+            <a:r>
+              <a:rPr lang="en-US" sz="2800" b="1" dirty="0">
+                <a:solidFill>
+                  <a:srgbClr val="FFFFFF"/>
+                </a:solidFill>
+                <a:effectLst>
+                  <a:outerShdw blurRad="38100" dist="38100" dir="2700000" algn="tl">
+                    <a:srgbClr val="000000">
+                      <a:alpha val="43137"/>
+                    </a:srgbClr>
+                  </a:outerShdw>
+                </a:effectLst>
+              </a:rPr>
+              <a:t>]</a:t>
+            </a:r>
+            <a:endParaRPr lang="bg-BG" sz="2800" b="1" dirty="0">
               <a:solidFill>
                 <a:srgbClr val="FFFFFF"/>
               </a:solidFill>
@@ -13883,6 +13935,51 @@
                       </p:childTnLst>
                     </p:cTn>
                   </p:par>
+                  <p:par>
+                    <p:cTn id="11" fill="hold">
+                      <p:stCondLst>
+                        <p:cond delay="indefinite"/>
+                      </p:stCondLst>
+                      <p:childTnLst>
+                        <p:par>
+                          <p:cTn id="12" fill="hold">
+                            <p:stCondLst>
+                              <p:cond delay="0"/>
+                            </p:stCondLst>
+                            <p:childTnLst>
+                              <p:par>
+                                <p:cTn id="13" presetID="1" presetClass="entr" presetSubtype="0" fill="hold" grpId="0" nodeType="clickEffect">
+                                  <p:stCondLst>
+                                    <p:cond delay="0"/>
+                                  </p:stCondLst>
+                                  <p:childTnLst>
+                                    <p:set>
+                                      <p:cBhvr>
+                                        <p:cTn id="14" dur="1" fill="hold">
+                                          <p:stCondLst>
+                                            <p:cond delay="0"/>
+                                          </p:stCondLst>
+                                        </p:cTn>
+                                        <p:tgtEl>
+                                          <p:spTgt spid="2"/>
+                                        </p:tgtEl>
+                                        <p:attrNameLst>
+                                          <p:attrName>style.visibility</p:attrName>
+                                        </p:attrNameLst>
+                                      </p:cBhvr>
+                                      <p:to>
+                                        <p:strVal val="visible"/>
+                                      </p:to>
+                                    </p:set>
+                                  </p:childTnLst>
+                                </p:cTn>
+                              </p:par>
+                            </p:childTnLst>
+                          </p:cTn>
+                        </p:par>
+                      </p:childTnLst>
+                    </p:cTn>
+                  </p:par>
                 </p:childTnLst>
               </p:cTn>
               <p:prevCondLst>
@@ -13907,6 +14004,7 @@
     <p:bldLst>
       <p:bldP spid="5" grpId="0" animBg="1"/>
       <p:bldP spid="7" grpId="0" animBg="1"/>
+      <p:bldP spid="2" grpId="0" animBg="1"/>
     </p:bldLst>
   </p:timing>
 </p:sld>
@@ -15196,7 +15294,7 @@
                   <a:schemeClr val="bg2"/>
                 </a:solidFill>
               </a:rPr>
-              <a:t>Адреса</a:t>
+              <a:t>Адрес</a:t>
             </a:r>
             <a:r>
               <a:rPr lang="bg-BG" sz="3000" b="1" dirty="0">
@@ -15801,7 +15899,7 @@
         </p:blipFill>
         <p:spPr>
           <a:xfrm>
-            <a:off x="4965687" y="1809000"/>
+            <a:off x="4950000" y="1809000"/>
             <a:ext cx="2292000" cy="1719000"/>
           </a:xfrm>
           <a:prstGeom prst="rect">
@@ -15944,7 +16042,7 @@
                 <a:hlinkClick r:id="rId3">
                   <a:extLst>
                     <a:ext uri="{A12FA001-AC4F-418D-AE19-62706E023703}">
-                      <ahyp:hlinkClr xmlns:ahyp="http://schemas.microsoft.com/office/drawing/2018/hyperlinkcolor" xmlns="" val="tx"/>
+                      <ahyp:hlinkClr xmlns:ahyp="http://schemas.microsoft.com/office/drawing/2018/hyperlinkcolor" val="tx"/>
                     </a:ext>
                   </a:extLst>
                 </a:hlinkClick>
@@ -16701,78 +16799,6 @@
                       </p:childTnLst>
                     </p:cTn>
                   </p:par>
-                  <p:par>
-                    <p:cTn id="7" fill="hold">
-                      <p:stCondLst>
-                        <p:cond delay="indefinite"/>
-                      </p:stCondLst>
-                      <p:childTnLst>
-                        <p:par>
-                          <p:cTn id="8" fill="hold">
-                            <p:stCondLst>
-                              <p:cond delay="0"/>
-                            </p:stCondLst>
-                            <p:childTnLst>
-                              <p:par>
-                                <p:cTn id="9" presetID="1" presetClass="entr" presetSubtype="0" fill="hold" nodeType="clickEffect">
-                                  <p:stCondLst>
-                                    <p:cond delay="0"/>
-                                  </p:stCondLst>
-                                  <p:childTnLst>
-                                    <p:set>
-                                      <p:cBhvr>
-                                        <p:cTn id="10" dur="1" fill="hold">
-                                          <p:stCondLst>
-                                            <p:cond delay="0"/>
-                                          </p:stCondLst>
-                                        </p:cTn>
-                                        <p:tgtEl>
-                                          <p:spTgt spid="6"/>
-                                        </p:tgtEl>
-                                        <p:attrNameLst>
-                                          <p:attrName>style.visibility</p:attrName>
-                                        </p:attrNameLst>
-                                      </p:cBhvr>
-                                      <p:to>
-                                        <p:strVal val="visible"/>
-                                      </p:to>
-                                    </p:set>
-                                  </p:childTnLst>
-                                </p:cTn>
-                              </p:par>
-                              <p:par>
-                                <p:cTn id="11" presetID="1" presetClass="entr" presetSubtype="0" fill="hold" nodeType="withEffect">
-                                  <p:stCondLst>
-                                    <p:cond delay="0"/>
-                                  </p:stCondLst>
-                                  <p:childTnLst>
-                                    <p:set>
-                                      <p:cBhvr>
-                                        <p:cTn id="12" dur="1" fill="hold">
-                                          <p:stCondLst>
-                                            <p:cond delay="0"/>
-                                          </p:stCondLst>
-                                        </p:cTn>
-                                        <p:tgtEl>
-                                          <p:spTgt spid="7"/>
-                                        </p:tgtEl>
-                                        <p:attrNameLst>
-                                          <p:attrName>style.visibility</p:attrName>
-                                        </p:attrNameLst>
-                                      </p:cBhvr>
-                                      <p:to>
-                                        <p:strVal val="visible"/>
-                                      </p:to>
-                                    </p:set>
-                                  </p:childTnLst>
-                                </p:cTn>
-                              </p:par>
-                            </p:childTnLst>
-                          </p:cTn>
-                        </p:par>
-                      </p:childTnLst>
-                    </p:cTn>
-                  </p:par>
                 </p:childTnLst>
               </p:cTn>
               <p:prevCondLst>
@@ -16925,7 +16951,7 @@
             <a:pPr lvl="1"/>
             <a:r>
               <a:rPr lang="bg-BG" dirty="0"/>
-              <a:t>Адреса</a:t>
+              <a:t>Адрес</a:t>
             </a:r>
             <a:r>
               <a:rPr lang="bg-BG" b="1" dirty="0"/>
@@ -17346,8 +17372,8 @@
         </p:nvSpPr>
         <p:spPr>
           <a:xfrm>
-            <a:off x="615109" y="5315916"/>
-            <a:ext cx="10961783" cy="768084"/>
+            <a:off x="614362" y="5184000"/>
+            <a:ext cx="10963275" cy="768350"/>
           </a:xfrm>
         </p:spPr>
         <p:txBody>
@@ -17356,41 +17382,9 @@
           <a:p>
             <a:r>
               <a:rPr lang="bg-BG" dirty="0"/>
-              <a:t>Регистрация на ел. поща</a:t>
+              <a:t>Регистрация на електронна поща</a:t>
             </a:r>
             <a:endParaRPr lang="en-US" dirty="0"/>
-          </a:p>
-        </p:txBody>
-      </p:sp>
-      <p:sp>
-        <p:nvSpPr>
-          <p:cNvPr id="2" name="Slide Number Placeholder 1"/>
-          <p:cNvSpPr>
-            <a:spLocks noGrp="1"/>
-          </p:cNvSpPr>
-          <p:nvPr>
-            <p:ph type="sldNum" sz="quarter" idx="4294967295"/>
-          </p:nvPr>
-        </p:nvSpPr>
-        <p:spPr>
-          <a:xfrm>
-            <a:off x="11823700" y="6507163"/>
-            <a:ext cx="368300" cy="296862"/>
-          </a:xfrm>
-          <a:prstGeom prst="rect">
-            <a:avLst/>
-          </a:prstGeom>
-        </p:spPr>
-        <p:txBody>
-          <a:bodyPr/>
-          <a:lstStyle/>
-          <a:p>
-            <a:fld id="{2BF067CD-8E6B-4360-9AA8-C5DF2A48A6D1}" type="slidenum">
-              <a:rPr lang="en-US" noProof="0" smtClean="0"/>
-              <a:pPr/>
-              <a:t>6</a:t>
-            </a:fld>
-            <a:endParaRPr lang="en-US" noProof="0" dirty="0"/>
           </a:p>
         </p:txBody>
       </p:sp>
@@ -17416,8 +17410,8 @@
         </p:blipFill>
         <p:spPr>
           <a:xfrm>
-            <a:off x="3174122" y="729000"/>
-            <a:ext cx="5843755" cy="3690792"/>
+            <a:off x="3082561" y="726555"/>
+            <a:ext cx="6026878" cy="3806449"/>
           </a:xfrm>
           <a:prstGeom prst="rect">
             <a:avLst/>
@@ -17449,13 +17443,6 @@
       <p:transition spd="slow" advClick="0" advTm="5000"/>
     </mc:Fallback>
   </mc:AlternateContent>
-  <p:timing>
-    <p:tnLst>
-      <p:par>
-        <p:cTn id="1" dur="indefinite" restart="never" nodeType="tmRoot"/>
-      </p:par>
-    </p:tnLst>
-  </p:timing>
 </p:sld>
 </file>
 
@@ -17911,8 +17898,8 @@
         </p:nvSpPr>
         <p:spPr bwMode="auto">
           <a:xfrm>
-            <a:off x="336000" y="1989000"/>
-            <a:ext cx="3510000" cy="1575000"/>
+            <a:off x="786000" y="1989000"/>
+            <a:ext cx="3060000" cy="1575000"/>
           </a:xfrm>
           <a:prstGeom prst="wedgeRoundRectCallout">
             <a:avLst>
@@ -17975,7 +17962,7 @@
                   </a:outerShdw>
                 </a:effectLst>
               </a:rPr>
-              <a:t>Първоначално ще трябва да въведете име за профила</a:t>
+              <a:t>Първоначално въведете име за профила</a:t>
             </a:r>
             <a:endParaRPr lang="en-US" sz="2800" b="1" dirty="0">
               <a:solidFill>

</xml_diff>